<commit_message>
Updated with thank you
</commit_message>
<xml_diff>
--- a/Unity 2d Sharp.pptx
+++ b/Unity 2d Sharp.pptx
@@ -5,24 +5,25 @@
     <p:sldMasterId id="2147483648" r:id="rId1"/>
   </p:sldMasterIdLst>
   <p:notesMasterIdLst>
-    <p:notesMasterId r:id="rId17"/>
+    <p:notesMasterId r:id="rId18"/>
   </p:notesMasterIdLst>
   <p:sldIdLst>
     <p:sldId id="256" r:id="rId2"/>
     <p:sldId id="257" r:id="rId3"/>
-    <p:sldId id="266" r:id="rId4"/>
-    <p:sldId id="258" r:id="rId5"/>
-    <p:sldId id="259" r:id="rId6"/>
-    <p:sldId id="260" r:id="rId7"/>
-    <p:sldId id="267" r:id="rId8"/>
-    <p:sldId id="268" r:id="rId9"/>
-    <p:sldId id="261" r:id="rId10"/>
-    <p:sldId id="264" r:id="rId11"/>
-    <p:sldId id="262" r:id="rId12"/>
-    <p:sldId id="263" r:id="rId13"/>
-    <p:sldId id="265" r:id="rId14"/>
-    <p:sldId id="269" r:id="rId15"/>
-    <p:sldId id="270" r:id="rId16"/>
+    <p:sldId id="271" r:id="rId4"/>
+    <p:sldId id="266" r:id="rId5"/>
+    <p:sldId id="258" r:id="rId6"/>
+    <p:sldId id="259" r:id="rId7"/>
+    <p:sldId id="260" r:id="rId8"/>
+    <p:sldId id="267" r:id="rId9"/>
+    <p:sldId id="268" r:id="rId10"/>
+    <p:sldId id="261" r:id="rId11"/>
+    <p:sldId id="264" r:id="rId12"/>
+    <p:sldId id="262" r:id="rId13"/>
+    <p:sldId id="263" r:id="rId14"/>
+    <p:sldId id="265" r:id="rId15"/>
+    <p:sldId id="269" r:id="rId16"/>
+    <p:sldId id="270" r:id="rId17"/>
   </p:sldIdLst>
   <p:sldSz cx="12192000" cy="6858000"/>
   <p:notesSz cx="6858000" cy="9144000"/>
@@ -211,7 +212,7 @@
           <a:p>
             <a:fld id="{29D815E7-D11B-4BA5-97A3-AD520414927D}" type="datetimeFigureOut">
               <a:rPr lang="en-US" smtClean="0"/>
-              <a:t>8/20/2014</a:t>
+              <a:t>8/21/2014</a:t>
             </a:fld>
             <a:endParaRPr lang="en-US"/>
           </a:p>
@@ -587,7 +588,7 @@
           <a:p>
             <a:fld id="{7ADD2AF6-08E4-4F9E-B1FF-261DDBCF137B}" type="slidenum">
               <a:rPr lang="en-US" smtClean="0"/>
-              <a:t>8</a:t>
+              <a:t>9</a:t>
             </a:fld>
             <a:endParaRPr lang="en-US"/>
           </a:p>
@@ -730,7 +731,7 @@
           <a:p>
             <a:fld id="{7ADD2AF6-08E4-4F9E-B1FF-261DDBCF137B}" type="slidenum">
               <a:rPr lang="en-US" smtClean="0"/>
-              <a:t>9</a:t>
+              <a:t>10</a:t>
             </a:fld>
             <a:endParaRPr lang="en-US"/>
           </a:p>
@@ -904,7 +905,7 @@
           <a:p>
             <a:fld id="{7ADD2AF6-08E4-4F9E-B1FF-261DDBCF137B}" type="slidenum">
               <a:rPr lang="en-US" smtClean="0"/>
-              <a:t>10</a:t>
+              <a:t>11</a:t>
             </a:fld>
             <a:endParaRPr lang="en-US"/>
           </a:p>
@@ -1050,7 +1051,7 @@
           <a:p>
             <a:fld id="{7ADD2AF6-08E4-4F9E-B1FF-261DDBCF137B}" type="slidenum">
               <a:rPr lang="en-US" smtClean="0"/>
-              <a:t>11</a:t>
+              <a:t>12</a:t>
             </a:fld>
             <a:endParaRPr lang="en-US"/>
           </a:p>
@@ -1176,7 +1177,7 @@
           <a:p>
             <a:fld id="{7ADD2AF6-08E4-4F9E-B1FF-261DDBCF137B}" type="slidenum">
               <a:rPr lang="en-US" smtClean="0"/>
-              <a:t>12</a:t>
+              <a:t>13</a:t>
             </a:fld>
             <a:endParaRPr lang="en-US"/>
           </a:p>
@@ -1447,7 +1448,7 @@
           <a:p>
             <a:fld id="{7ADD2AF6-08E4-4F9E-B1FF-261DDBCF137B}" type="slidenum">
               <a:rPr lang="en-US" smtClean="0"/>
-              <a:t>13</a:t>
+              <a:t>14</a:t>
             </a:fld>
             <a:endParaRPr lang="en-US"/>
           </a:p>
@@ -1556,7 +1557,7 @@
           <a:p>
             <a:fld id="{7ADD2AF6-08E4-4F9E-B1FF-261DDBCF137B}" type="slidenum">
               <a:rPr lang="en-US" smtClean="0"/>
-              <a:t>14</a:t>
+              <a:t>15</a:t>
             </a:fld>
             <a:endParaRPr lang="en-US"/>
           </a:p>
@@ -1710,7 +1711,7 @@
           <a:p>
             <a:fld id="{472319A9-3C60-444A-AA7F-13388D33BEC4}" type="datetimeFigureOut">
               <a:rPr lang="en-US" smtClean="0"/>
-              <a:t>8/20/2014</a:t>
+              <a:t>8/21/2014</a:t>
             </a:fld>
             <a:endParaRPr lang="en-US" dirty="0"/>
           </a:p>
@@ -1905,7 +1906,7 @@
           <a:p>
             <a:fld id="{472319A9-3C60-444A-AA7F-13388D33BEC4}" type="datetimeFigureOut">
               <a:rPr lang="en-US" smtClean="0"/>
-              <a:t>8/20/2014</a:t>
+              <a:t>8/21/2014</a:t>
             </a:fld>
             <a:endParaRPr lang="en-US" dirty="0"/>
           </a:p>
@@ -2116,7 +2117,7 @@
           <a:p>
             <a:fld id="{472319A9-3C60-444A-AA7F-13388D33BEC4}" type="datetimeFigureOut">
               <a:rPr lang="en-US" smtClean="0"/>
-              <a:t>8/20/2014</a:t>
+              <a:t>8/21/2014</a:t>
             </a:fld>
             <a:endParaRPr lang="en-US" dirty="0"/>
           </a:p>
@@ -2311,7 +2312,7 @@
           <a:p>
             <a:fld id="{472319A9-3C60-444A-AA7F-13388D33BEC4}" type="datetimeFigureOut">
               <a:rPr lang="en-US" smtClean="0"/>
-              <a:t>8/20/2014</a:t>
+              <a:t>8/21/2014</a:t>
             </a:fld>
             <a:endParaRPr lang="en-US" dirty="0"/>
           </a:p>
@@ -2568,7 +2569,7 @@
           <a:p>
             <a:fld id="{472319A9-3C60-444A-AA7F-13388D33BEC4}" type="datetimeFigureOut">
               <a:rPr lang="en-US" smtClean="0"/>
-              <a:t>8/20/2014</a:t>
+              <a:t>8/21/2014</a:t>
             </a:fld>
             <a:endParaRPr lang="en-US" dirty="0"/>
           </a:p>
@@ -2807,7 +2808,7 @@
           <a:p>
             <a:fld id="{472319A9-3C60-444A-AA7F-13388D33BEC4}" type="datetimeFigureOut">
               <a:rPr lang="en-US" smtClean="0"/>
-              <a:t>8/20/2014</a:t>
+              <a:t>8/21/2014</a:t>
             </a:fld>
             <a:endParaRPr lang="en-US" dirty="0"/>
           </a:p>
@@ -3221,7 +3222,7 @@
           <a:p>
             <a:fld id="{472319A9-3C60-444A-AA7F-13388D33BEC4}" type="datetimeFigureOut">
               <a:rPr lang="en-US" smtClean="0"/>
-              <a:t>8/20/2014</a:t>
+              <a:t>8/21/2014</a:t>
             </a:fld>
             <a:endParaRPr lang="en-US" dirty="0"/>
           </a:p>
@@ -3346,7 +3347,7 @@
           <a:p>
             <a:fld id="{472319A9-3C60-444A-AA7F-13388D33BEC4}" type="datetimeFigureOut">
               <a:rPr lang="en-US" smtClean="0"/>
-              <a:t>8/20/2014</a:t>
+              <a:t>8/21/2014</a:t>
             </a:fld>
             <a:endParaRPr lang="en-US" dirty="0"/>
           </a:p>
@@ -3448,7 +3449,7 @@
           <a:p>
             <a:fld id="{472319A9-3C60-444A-AA7F-13388D33BEC4}" type="datetimeFigureOut">
               <a:rPr lang="en-US" smtClean="0"/>
-              <a:t>8/20/2014</a:t>
+              <a:t>8/21/2014</a:t>
             </a:fld>
             <a:endParaRPr lang="en-US" dirty="0"/>
           </a:p>
@@ -3731,7 +3732,7 @@
           <a:p>
             <a:fld id="{472319A9-3C60-444A-AA7F-13388D33BEC4}" type="datetimeFigureOut">
               <a:rPr lang="en-US" smtClean="0"/>
-              <a:t>8/20/2014</a:t>
+              <a:t>8/21/2014</a:t>
             </a:fld>
             <a:endParaRPr lang="en-US" dirty="0"/>
           </a:p>
@@ -3997,7 +3998,7 @@
           <a:p>
             <a:fld id="{472319A9-3C60-444A-AA7F-13388D33BEC4}" type="datetimeFigureOut">
               <a:rPr lang="en-US" smtClean="0"/>
-              <a:t>8/20/2014</a:t>
+              <a:t>8/21/2014</a:t>
             </a:fld>
             <a:endParaRPr lang="en-US" dirty="0"/>
           </a:p>
@@ -4226,7 +4227,7 @@
             <a:fld id="{472319A9-3C60-444A-AA7F-13388D33BEC4}" type="datetimeFigureOut">
               <a:rPr lang="en-US" smtClean="0"/>
               <a:pPr/>
-              <a:t>8/20/2014</a:t>
+              <a:t>8/21/2014</a:t>
             </a:fld>
             <a:endParaRPr lang="en-US" dirty="0"/>
           </a:p>
@@ -4761,6 +4762,260 @@
           <a:p>
             <a:r>
               <a:rPr lang="en-US" dirty="0" smtClean="0"/>
+              <a:t>Give and Take Life</a:t>
+            </a:r>
+            <a:endParaRPr lang="en-US" dirty="0"/>
+          </a:p>
+        </p:txBody>
+      </p:sp>
+      <p:sp>
+        <p:nvSpPr>
+          <p:cNvPr id="3" name="Content Placeholder 2"/>
+          <p:cNvSpPr>
+            <a:spLocks noGrp="1"/>
+          </p:cNvSpPr>
+          <p:nvPr>
+            <p:ph idx="1"/>
+          </p:nvPr>
+        </p:nvSpPr>
+        <p:spPr/>
+        <p:txBody>
+          <a:bodyPr/>
+          <a:lstStyle/>
+          <a:p>
+            <a:r>
+              <a:rPr lang="en-US" dirty="0" smtClean="0"/>
+              <a:t>We are still missing something… Cats</a:t>
+            </a:r>
+          </a:p>
+          <a:p>
+            <a:pPr lvl="1"/>
+            <a:r>
+              <a:rPr lang="en-US" dirty="0" smtClean="0"/>
+              <a:t>Add A Robot Cat</a:t>
+            </a:r>
+          </a:p>
+          <a:p>
+            <a:pPr lvl="1"/>
+            <a:r>
+              <a:rPr lang="en-US" dirty="0" smtClean="0"/>
+              <a:t>Dissect the anatomy of the Cat</a:t>
+            </a:r>
+          </a:p>
+          <a:p>
+            <a:pPr lvl="1"/>
+            <a:r>
+              <a:rPr lang="en-US" dirty="0" smtClean="0"/>
+              <a:t>Reanimate the cat</a:t>
+            </a:r>
+          </a:p>
+          <a:p>
+            <a:pPr lvl="1"/>
+            <a:r>
+              <a:rPr lang="en-US" dirty="0" smtClean="0"/>
+              <a:t>Place the Cat into the world</a:t>
+            </a:r>
+          </a:p>
+        </p:txBody>
+      </p:sp>
+      <p:pic>
+        <p:nvPicPr>
+          <p:cNvPr id="4" name="Picture 3"/>
+          <p:cNvPicPr>
+            <a:picLocks noChangeAspect="1"/>
+          </p:cNvPicPr>
+          <p:nvPr/>
+        </p:nvPicPr>
+        <p:blipFill>
+          <a:blip r:embed="rId3">
+            <a:extLst>
+              <a:ext uri="{28A0092B-C50C-407E-A947-70E740481C1C}">
+                <a14:useLocalDpi xmlns:a14="http://schemas.microsoft.com/office/drawing/2010/main" val="0"/>
+              </a:ext>
+            </a:extLst>
+          </a:blip>
+          <a:stretch>
+            <a:fillRect/>
+          </a:stretch>
+        </p:blipFill>
+        <p:spPr>
+          <a:xfrm>
+            <a:off x="10134600" y="250927"/>
+            <a:ext cx="1219200" cy="6400800"/>
+          </a:xfrm>
+          <a:prstGeom prst="rect">
+            <a:avLst/>
+          </a:prstGeom>
+        </p:spPr>
+      </p:pic>
+    </p:spTree>
+    <p:extLst>
+      <p:ext uri="{BB962C8B-B14F-4D97-AF65-F5344CB8AC3E}">
+        <p14:creationId xmlns:p14="http://schemas.microsoft.com/office/powerpoint/2010/main" val="1321721350"/>
+      </p:ext>
+    </p:extLst>
+  </p:cSld>
+  <p:clrMapOvr>
+    <a:masterClrMapping/>
+  </p:clrMapOvr>
+  <p:timing>
+    <p:tnLst>
+      <p:par>
+        <p:cTn id="1" dur="indefinite" restart="never" nodeType="tmRoot">
+          <p:childTnLst>
+            <p:seq concurrent="1" nextAc="seek">
+              <p:cTn id="2" dur="indefinite" nodeType="mainSeq">
+                <p:childTnLst>
+                  <p:par>
+                    <p:cTn id="3" fill="hold">
+                      <p:stCondLst>
+                        <p:cond delay="indefinite"/>
+                      </p:stCondLst>
+                      <p:childTnLst>
+                        <p:par>
+                          <p:cTn id="4" fill="hold">
+                            <p:stCondLst>
+                              <p:cond delay="0"/>
+                            </p:stCondLst>
+                            <p:childTnLst>
+                              <p:par>
+                                <p:cTn id="5" presetID="2" presetClass="entr" presetSubtype="2" fill="hold" nodeType="clickEffect">
+                                  <p:stCondLst>
+                                    <p:cond delay="0"/>
+                                  </p:stCondLst>
+                                  <p:childTnLst>
+                                    <p:set>
+                                      <p:cBhvr>
+                                        <p:cTn id="6" dur="1" fill="hold">
+                                          <p:stCondLst>
+                                            <p:cond delay="0"/>
+                                          </p:stCondLst>
+                                        </p:cTn>
+                                        <p:tgtEl>
+                                          <p:spTgt spid="4"/>
+                                        </p:tgtEl>
+                                        <p:attrNameLst>
+                                          <p:attrName>style.visibility</p:attrName>
+                                        </p:attrNameLst>
+                                      </p:cBhvr>
+                                      <p:to>
+                                        <p:strVal val="visible"/>
+                                      </p:to>
+                                    </p:set>
+                                    <p:anim calcmode="lin" valueType="num">
+                                      <p:cBhvr additive="base">
+                                        <p:cTn id="7" dur="500" fill="hold"/>
+                                        <p:tgtEl>
+                                          <p:spTgt spid="4"/>
+                                        </p:tgtEl>
+                                        <p:attrNameLst>
+                                          <p:attrName>ppt_x</p:attrName>
+                                        </p:attrNameLst>
+                                      </p:cBhvr>
+                                      <p:tavLst>
+                                        <p:tav tm="0">
+                                          <p:val>
+                                            <p:strVal val="1+#ppt_w/2"/>
+                                          </p:val>
+                                        </p:tav>
+                                        <p:tav tm="100000">
+                                          <p:val>
+                                            <p:strVal val="#ppt_x"/>
+                                          </p:val>
+                                        </p:tav>
+                                      </p:tavLst>
+                                    </p:anim>
+                                    <p:anim calcmode="lin" valueType="num">
+                                      <p:cBhvr additive="base">
+                                        <p:cTn id="8" dur="500" fill="hold"/>
+                                        <p:tgtEl>
+                                          <p:spTgt spid="4"/>
+                                        </p:tgtEl>
+                                        <p:attrNameLst>
+                                          <p:attrName>ppt_y</p:attrName>
+                                        </p:attrNameLst>
+                                      </p:cBhvr>
+                                      <p:tavLst>
+                                        <p:tav tm="0">
+                                          <p:val>
+                                            <p:strVal val="#ppt_y"/>
+                                          </p:val>
+                                        </p:tav>
+                                        <p:tav tm="100000">
+                                          <p:val>
+                                            <p:strVal val="#ppt_y"/>
+                                          </p:val>
+                                        </p:tav>
+                                      </p:tavLst>
+                                    </p:anim>
+                                  </p:childTnLst>
+                                </p:cTn>
+                              </p:par>
+                            </p:childTnLst>
+                          </p:cTn>
+                        </p:par>
+                      </p:childTnLst>
+                    </p:cTn>
+                  </p:par>
+                </p:childTnLst>
+              </p:cTn>
+              <p:prevCondLst>
+                <p:cond evt="onPrev" delay="0">
+                  <p:tgtEl>
+                    <p:sldTgt/>
+                  </p:tgtEl>
+                </p:cond>
+              </p:prevCondLst>
+              <p:nextCondLst>
+                <p:cond evt="onNext" delay="0">
+                  <p:tgtEl>
+                    <p:sldTgt/>
+                  </p:tgtEl>
+                </p:cond>
+              </p:nextCondLst>
+            </p:seq>
+          </p:childTnLst>
+        </p:cTn>
+      </p:par>
+    </p:tnLst>
+  </p:timing>
+</p:sld>
+</file>
+
+<file path=ppt/slides/slide11.xml><?xml version="1.0" encoding="utf-8"?>
+<p:sld xmlns:a="http://schemas.openxmlformats.org/drawingml/2006/main" xmlns:r="http://schemas.openxmlformats.org/officeDocument/2006/relationships" xmlns:p="http://schemas.openxmlformats.org/presentationml/2006/main">
+  <p:cSld>
+    <p:spTree>
+      <p:nvGrpSpPr>
+        <p:cNvPr id="1" name=""/>
+        <p:cNvGrpSpPr/>
+        <p:nvPr/>
+      </p:nvGrpSpPr>
+      <p:grpSpPr>
+        <a:xfrm>
+          <a:off x="0" y="0"/>
+          <a:ext cx="0" cy="0"/>
+          <a:chOff x="0" y="0"/>
+          <a:chExt cx="0" cy="0"/>
+        </a:xfrm>
+      </p:grpSpPr>
+      <p:sp>
+        <p:nvSpPr>
+          <p:cNvPr id="2" name="Title 1"/>
+          <p:cNvSpPr>
+            <a:spLocks noGrp="1"/>
+          </p:cNvSpPr>
+          <p:nvPr>
+            <p:ph type="title"/>
+          </p:nvPr>
+        </p:nvSpPr>
+        <p:spPr/>
+        <p:txBody>
+          <a:bodyPr/>
+          <a:lstStyle/>
+          <a:p>
+            <a:r>
+              <a:rPr lang="en-US" dirty="0" smtClean="0"/>
               <a:t>Bend Science to Your Will</a:t>
             </a:r>
             <a:endParaRPr lang="en-US" dirty="0"/>
@@ -4859,7 +5114,7 @@
 </p:sld>
 </file>
 
-<file path=ppt/slides/slide11.xml><?xml version="1.0" encoding="utf-8"?>
+<file path=ppt/slides/slide12.xml><?xml version="1.0" encoding="utf-8"?>
 <p:sld xmlns:a="http://schemas.openxmlformats.org/drawingml/2006/main" xmlns:r="http://schemas.openxmlformats.org/officeDocument/2006/relationships" xmlns:p="http://schemas.openxmlformats.org/presentationml/2006/main">
   <p:cSld>
     <p:spTree>
@@ -5509,7 +5764,7 @@
 </p:sld>
 </file>
 
-<file path=ppt/slides/slide12.xml><?xml version="1.0" encoding="utf-8"?>
+<file path=ppt/slides/slide13.xml><?xml version="1.0" encoding="utf-8"?>
 <p:sld xmlns:a="http://schemas.openxmlformats.org/drawingml/2006/main" xmlns:r="http://schemas.openxmlformats.org/officeDocument/2006/relationships" xmlns:p="http://schemas.openxmlformats.org/presentationml/2006/main">
   <p:cSld>
     <p:spTree>
@@ -5871,7 +6126,7 @@
 </p:sld>
 </file>
 
-<file path=ppt/slides/slide13.xml><?xml version="1.0" encoding="utf-8"?>
+<file path=ppt/slides/slide14.xml><?xml version="1.0" encoding="utf-8"?>
 <p:sld xmlns:a="http://schemas.openxmlformats.org/drawingml/2006/main" xmlns:r="http://schemas.openxmlformats.org/officeDocument/2006/relationships" xmlns:p="http://schemas.openxmlformats.org/presentationml/2006/main">
   <p:cSld>
     <p:spTree>
@@ -6065,7 +6320,7 @@
 </p:sld>
 </file>
 
-<file path=ppt/slides/slide14.xml><?xml version="1.0" encoding="utf-8"?>
+<file path=ppt/slides/slide15.xml><?xml version="1.0" encoding="utf-8"?>
 <p:sld xmlns:a="http://schemas.openxmlformats.org/drawingml/2006/main" xmlns:r="http://schemas.openxmlformats.org/officeDocument/2006/relationships" xmlns:p="http://schemas.openxmlformats.org/presentationml/2006/main">
   <p:cSld>
     <p:spTree>
@@ -6757,7 +7012,7 @@
 </p:sld>
 </file>
 
-<file path=ppt/slides/slide15.xml><?xml version="1.0" encoding="utf-8"?>
+<file path=ppt/slides/slide16.xml><?xml version="1.0" encoding="utf-8"?>
 <p:sld xmlns:a="http://schemas.openxmlformats.org/drawingml/2006/main" xmlns:r="http://schemas.openxmlformats.org/officeDocument/2006/relationships" xmlns:p="http://schemas.openxmlformats.org/presentationml/2006/main">
   <p:cSld>
     <p:spTree>
@@ -7548,7 +7803,7 @@
       </p:grpSpPr>
       <p:sp>
         <p:nvSpPr>
-          <p:cNvPr id="2" name="Title 1"/>
+          <p:cNvPr id="5" name="Title 4"/>
           <p:cNvSpPr>
             <a:spLocks noGrp="1"/>
           </p:cNvSpPr>
@@ -7563,7 +7818,7 @@
           <a:p>
             <a:r>
               <a:rPr lang="en-US" dirty="0" smtClean="0"/>
-              <a:t>What</a:t>
+              <a:t>Thank You</a:t>
             </a:r>
             <a:endParaRPr lang="en-US" dirty="0"/>
           </a:p>
@@ -7571,7 +7826,7 @@
       </p:sp>
       <p:sp>
         <p:nvSpPr>
-          <p:cNvPr id="3" name="Content Placeholder 2"/>
+          <p:cNvPr id="6" name="Content Placeholder 5"/>
           <p:cNvSpPr>
             <a:spLocks noGrp="1"/>
           </p:cNvSpPr>
@@ -7586,11 +7841,18 @@
           <a:p>
             <a:r>
               <a:rPr lang="en-US" dirty="0" smtClean="0"/>
-              <a:t>You </a:t>
-            </a:r>
-            <a:r>
-              <a:rPr lang="en-US" dirty="0" smtClean="0"/>
-              <a:t>will</a:t>
+              <a:t>Jesse Freeman – For the Art and Template</a:t>
+            </a:r>
+          </a:p>
+          <a:p>
+            <a:pPr lvl="1"/>
+            <a:r>
+              <a:rPr lang="en-US" dirty="0" smtClean="0"/>
+              <a:t>@</a:t>
+            </a:r>
+            <a:r>
+              <a:rPr lang="en-US" dirty="0" err="1" smtClean="0"/>
+              <a:t>JesseFreeman</a:t>
             </a:r>
             <a:endParaRPr lang="en-US" dirty="0" smtClean="0"/>
           </a:p>
@@ -7598,6 +7860,104 @@
             <a:pPr lvl="1"/>
             <a:r>
               <a:rPr lang="en-US" dirty="0" smtClean="0"/>
+              <a:t>Weekend Code Project: Unity’s New 2D Workflow</a:t>
+            </a:r>
+          </a:p>
+          <a:p>
+            <a:pPr lvl="1"/>
+            <a:r>
+              <a:rPr lang="en-US" dirty="0">
+                <a:hlinkClick r:id="rId2"/>
+              </a:rPr>
+              <a:t>https://</a:t>
+            </a:r>
+            <a:r>
+              <a:rPr lang="en-US" dirty="0" smtClean="0">
+                <a:hlinkClick r:id="rId2"/>
+              </a:rPr>
+              <a:t>gumroad.com/l/unity2d-platformer</a:t>
+            </a:r>
+            <a:endParaRPr lang="en-US" dirty="0" smtClean="0"/>
+          </a:p>
+        </p:txBody>
+      </p:sp>
+    </p:spTree>
+    <p:extLst>
+      <p:ext uri="{BB962C8B-B14F-4D97-AF65-F5344CB8AC3E}">
+        <p14:creationId xmlns:p14="http://schemas.microsoft.com/office/powerpoint/2010/main" val="2159460489"/>
+      </p:ext>
+    </p:extLst>
+  </p:cSld>
+  <p:clrMapOvr>
+    <a:masterClrMapping/>
+  </p:clrMapOvr>
+</p:sld>
+</file>
+
+<file path=ppt/slides/slide4.xml><?xml version="1.0" encoding="utf-8"?>
+<p:sld xmlns:a="http://schemas.openxmlformats.org/drawingml/2006/main" xmlns:r="http://schemas.openxmlformats.org/officeDocument/2006/relationships" xmlns:p="http://schemas.openxmlformats.org/presentationml/2006/main">
+  <p:cSld>
+    <p:spTree>
+      <p:nvGrpSpPr>
+        <p:cNvPr id="1" name=""/>
+        <p:cNvGrpSpPr/>
+        <p:nvPr/>
+      </p:nvGrpSpPr>
+      <p:grpSpPr>
+        <a:xfrm>
+          <a:off x="0" y="0"/>
+          <a:ext cx="0" cy="0"/>
+          <a:chOff x="0" y="0"/>
+          <a:chExt cx="0" cy="0"/>
+        </a:xfrm>
+      </p:grpSpPr>
+      <p:sp>
+        <p:nvSpPr>
+          <p:cNvPr id="2" name="Title 1"/>
+          <p:cNvSpPr>
+            <a:spLocks noGrp="1"/>
+          </p:cNvSpPr>
+          <p:nvPr>
+            <p:ph type="title"/>
+          </p:nvPr>
+        </p:nvSpPr>
+        <p:spPr/>
+        <p:txBody>
+          <a:bodyPr/>
+          <a:lstStyle/>
+          <a:p>
+            <a:r>
+              <a:rPr lang="en-US" dirty="0" smtClean="0"/>
+              <a:t>What</a:t>
+            </a:r>
+            <a:endParaRPr lang="en-US" dirty="0"/>
+          </a:p>
+        </p:txBody>
+      </p:sp>
+      <p:sp>
+        <p:nvSpPr>
+          <p:cNvPr id="3" name="Content Placeholder 2"/>
+          <p:cNvSpPr>
+            <a:spLocks noGrp="1"/>
+          </p:cNvSpPr>
+          <p:nvPr>
+            <p:ph idx="1"/>
+          </p:nvPr>
+        </p:nvSpPr>
+        <p:spPr/>
+        <p:txBody>
+          <a:bodyPr/>
+          <a:lstStyle/>
+          <a:p>
+            <a:r>
+              <a:rPr lang="en-US" dirty="0" smtClean="0"/>
+              <a:t>You will</a:t>
+            </a:r>
+          </a:p>
+          <a:p>
+            <a:pPr lvl="1"/>
+            <a:r>
+              <a:rPr lang="en-US" dirty="0" smtClean="0"/>
               <a:t>Subtract a D from the Universe</a:t>
             </a:r>
           </a:p>
@@ -7647,11 +8007,7 @@
             <a:pPr lvl="1"/>
             <a:r>
               <a:rPr lang="en-US" dirty="0" smtClean="0"/>
-              <a:t>Ask Many </a:t>
-            </a:r>
-            <a:r>
-              <a:rPr lang="en-US" dirty="0" smtClean="0"/>
-              <a:t>Questions</a:t>
+              <a:t>Ask Many Questions</a:t>
             </a:r>
           </a:p>
           <a:p>
@@ -7684,7 +8040,7 @@
 </p:sld>
 </file>
 
-<file path=ppt/slides/slide4.xml><?xml version="1.0" encoding="utf-8"?>
+<file path=ppt/slides/slide5.xml><?xml version="1.0" encoding="utf-8"?>
 <p:sld xmlns:a="http://schemas.openxmlformats.org/drawingml/2006/main" xmlns:r="http://schemas.openxmlformats.org/officeDocument/2006/relationships" xmlns:p="http://schemas.openxmlformats.org/presentationml/2006/main">
   <p:cSld>
     <p:spTree>
@@ -7942,7 +8298,7 @@
 </p:sld>
 </file>
 
-<file path=ppt/slides/slide5.xml><?xml version="1.0" encoding="utf-8"?>
+<file path=ppt/slides/slide6.xml><?xml version="1.0" encoding="utf-8"?>
 <p:sld xmlns:a="http://schemas.openxmlformats.org/drawingml/2006/main" xmlns:r="http://schemas.openxmlformats.org/officeDocument/2006/relationships" xmlns:p="http://schemas.openxmlformats.org/presentationml/2006/main">
   <p:cSld>
     <p:spTree>
@@ -8105,7 +8461,7 @@
 </p:sld>
 </file>
 
-<file path=ppt/slides/slide6.xml><?xml version="1.0" encoding="utf-8"?>
+<file path=ppt/slides/slide7.xml><?xml version="1.0" encoding="utf-8"?>
 <p:sld xmlns:a="http://schemas.openxmlformats.org/drawingml/2006/main" xmlns:r="http://schemas.openxmlformats.org/officeDocument/2006/relationships" xmlns:p="http://schemas.openxmlformats.org/presentationml/2006/main">
   <p:cSld>
     <p:spTree>
@@ -8297,7 +8653,7 @@
 </p:sld>
 </file>
 
-<file path=ppt/slides/slide7.xml><?xml version="1.0" encoding="utf-8"?>
+<file path=ppt/slides/slide8.xml><?xml version="1.0" encoding="utf-8"?>
 <p:sld xmlns:a="http://schemas.openxmlformats.org/drawingml/2006/main" xmlns:r="http://schemas.openxmlformats.org/officeDocument/2006/relationships" xmlns:p="http://schemas.openxmlformats.org/presentationml/2006/main">
   <p:cSld>
     <p:spTree>
@@ -8331,11 +8687,7 @@
           <a:p>
             <a:r>
               <a:rPr lang="en-US" dirty="0" smtClean="0"/>
-              <a:t>Why is Everything so </a:t>
-            </a:r>
-            <a:r>
-              <a:rPr lang="en-US" dirty="0" smtClean="0"/>
-              <a:t>Blue?</a:t>
+              <a:t>Why is Everything so Blue?</a:t>
             </a:r>
             <a:endParaRPr lang="en-US" dirty="0"/>
           </a:p>
@@ -8470,7 +8822,7 @@
 </p:sld>
 </file>
 
-<file path=ppt/slides/slide8.xml><?xml version="1.0" encoding="utf-8"?>
+<file path=ppt/slides/slide9.xml><?xml version="1.0" encoding="utf-8"?>
 <p:sld xmlns:a="http://schemas.openxmlformats.org/drawingml/2006/main" xmlns:r="http://schemas.openxmlformats.org/officeDocument/2006/relationships" xmlns:p="http://schemas.openxmlformats.org/presentationml/2006/main">
   <p:cSld>
     <p:spTree>
@@ -8548,11 +8900,7 @@
             <a:pPr lvl="1"/>
             <a:r>
               <a:rPr lang="en-US" dirty="0" smtClean="0"/>
-              <a:t>A </a:t>
-            </a:r>
-            <a:r>
-              <a:rPr lang="en-US" dirty="0" smtClean="0"/>
-              <a:t>Foreground</a:t>
+              <a:t>A Foreground</a:t>
             </a:r>
           </a:p>
           <a:p>
@@ -8619,260 +8967,6 @@
     <p:tnLst>
       <p:par>
         <p:cTn id="1" dur="indefinite" restart="never" nodeType="tmRoot"/>
-      </p:par>
-    </p:tnLst>
-  </p:timing>
-</p:sld>
-</file>
-
-<file path=ppt/slides/slide9.xml><?xml version="1.0" encoding="utf-8"?>
-<p:sld xmlns:a="http://schemas.openxmlformats.org/drawingml/2006/main" xmlns:r="http://schemas.openxmlformats.org/officeDocument/2006/relationships" xmlns:p="http://schemas.openxmlformats.org/presentationml/2006/main">
-  <p:cSld>
-    <p:spTree>
-      <p:nvGrpSpPr>
-        <p:cNvPr id="1" name=""/>
-        <p:cNvGrpSpPr/>
-        <p:nvPr/>
-      </p:nvGrpSpPr>
-      <p:grpSpPr>
-        <a:xfrm>
-          <a:off x="0" y="0"/>
-          <a:ext cx="0" cy="0"/>
-          <a:chOff x="0" y="0"/>
-          <a:chExt cx="0" cy="0"/>
-        </a:xfrm>
-      </p:grpSpPr>
-      <p:sp>
-        <p:nvSpPr>
-          <p:cNvPr id="2" name="Title 1"/>
-          <p:cNvSpPr>
-            <a:spLocks noGrp="1"/>
-          </p:cNvSpPr>
-          <p:nvPr>
-            <p:ph type="title"/>
-          </p:nvPr>
-        </p:nvSpPr>
-        <p:spPr/>
-        <p:txBody>
-          <a:bodyPr/>
-          <a:lstStyle/>
-          <a:p>
-            <a:r>
-              <a:rPr lang="en-US" dirty="0" smtClean="0"/>
-              <a:t>Give and Take Life</a:t>
-            </a:r>
-            <a:endParaRPr lang="en-US" dirty="0"/>
-          </a:p>
-        </p:txBody>
-      </p:sp>
-      <p:sp>
-        <p:nvSpPr>
-          <p:cNvPr id="3" name="Content Placeholder 2"/>
-          <p:cNvSpPr>
-            <a:spLocks noGrp="1"/>
-          </p:cNvSpPr>
-          <p:nvPr>
-            <p:ph idx="1"/>
-          </p:nvPr>
-        </p:nvSpPr>
-        <p:spPr/>
-        <p:txBody>
-          <a:bodyPr/>
-          <a:lstStyle/>
-          <a:p>
-            <a:r>
-              <a:rPr lang="en-US" dirty="0" smtClean="0"/>
-              <a:t>We are still missing something… Cats</a:t>
-            </a:r>
-          </a:p>
-          <a:p>
-            <a:pPr lvl="1"/>
-            <a:r>
-              <a:rPr lang="en-US" dirty="0" smtClean="0"/>
-              <a:t>Add A Robot Cat</a:t>
-            </a:r>
-          </a:p>
-          <a:p>
-            <a:pPr lvl="1"/>
-            <a:r>
-              <a:rPr lang="en-US" dirty="0" smtClean="0"/>
-              <a:t>Dissect the anatomy of the Cat</a:t>
-            </a:r>
-          </a:p>
-          <a:p>
-            <a:pPr lvl="1"/>
-            <a:r>
-              <a:rPr lang="en-US" dirty="0" smtClean="0"/>
-              <a:t>Reanimate the cat</a:t>
-            </a:r>
-          </a:p>
-          <a:p>
-            <a:pPr lvl="1"/>
-            <a:r>
-              <a:rPr lang="en-US" dirty="0" smtClean="0"/>
-              <a:t>Place the Cat into the world</a:t>
-            </a:r>
-          </a:p>
-        </p:txBody>
-      </p:sp>
-      <p:pic>
-        <p:nvPicPr>
-          <p:cNvPr id="4" name="Picture 3"/>
-          <p:cNvPicPr>
-            <a:picLocks noChangeAspect="1"/>
-          </p:cNvPicPr>
-          <p:nvPr/>
-        </p:nvPicPr>
-        <p:blipFill>
-          <a:blip r:embed="rId3">
-            <a:extLst>
-              <a:ext uri="{28A0092B-C50C-407E-A947-70E740481C1C}">
-                <a14:useLocalDpi xmlns:a14="http://schemas.microsoft.com/office/drawing/2010/main" val="0"/>
-              </a:ext>
-            </a:extLst>
-          </a:blip>
-          <a:stretch>
-            <a:fillRect/>
-          </a:stretch>
-        </p:blipFill>
-        <p:spPr>
-          <a:xfrm>
-            <a:off x="10134600" y="250927"/>
-            <a:ext cx="1219200" cy="6400800"/>
-          </a:xfrm>
-          <a:prstGeom prst="rect">
-            <a:avLst/>
-          </a:prstGeom>
-        </p:spPr>
-      </p:pic>
-    </p:spTree>
-    <p:extLst>
-      <p:ext uri="{BB962C8B-B14F-4D97-AF65-F5344CB8AC3E}">
-        <p14:creationId xmlns:p14="http://schemas.microsoft.com/office/powerpoint/2010/main" val="1321721350"/>
-      </p:ext>
-    </p:extLst>
-  </p:cSld>
-  <p:clrMapOvr>
-    <a:masterClrMapping/>
-  </p:clrMapOvr>
-  <p:timing>
-    <p:tnLst>
-      <p:par>
-        <p:cTn id="1" dur="indefinite" restart="never" nodeType="tmRoot">
-          <p:childTnLst>
-            <p:seq concurrent="1" nextAc="seek">
-              <p:cTn id="2" dur="indefinite" nodeType="mainSeq">
-                <p:childTnLst>
-                  <p:par>
-                    <p:cTn id="3" fill="hold">
-                      <p:stCondLst>
-                        <p:cond delay="indefinite"/>
-                      </p:stCondLst>
-                      <p:childTnLst>
-                        <p:par>
-                          <p:cTn id="4" fill="hold">
-                            <p:stCondLst>
-                              <p:cond delay="0"/>
-                            </p:stCondLst>
-                            <p:childTnLst>
-                              <p:par>
-                                <p:cTn id="5" presetID="2" presetClass="entr" presetSubtype="2" fill="hold" nodeType="clickEffect">
-                                  <p:stCondLst>
-                                    <p:cond delay="0"/>
-                                  </p:stCondLst>
-                                  <p:childTnLst>
-                                    <p:set>
-                                      <p:cBhvr>
-                                        <p:cTn id="6" dur="1" fill="hold">
-                                          <p:stCondLst>
-                                            <p:cond delay="0"/>
-                                          </p:stCondLst>
-                                        </p:cTn>
-                                        <p:tgtEl>
-                                          <p:spTgt spid="4"/>
-                                        </p:tgtEl>
-                                        <p:attrNameLst>
-                                          <p:attrName>style.visibility</p:attrName>
-                                        </p:attrNameLst>
-                                      </p:cBhvr>
-                                      <p:to>
-                                        <p:strVal val="visible"/>
-                                      </p:to>
-                                    </p:set>
-                                    <p:anim calcmode="lin" valueType="num">
-                                      <p:cBhvr additive="base">
-                                        <p:cTn id="7" dur="500" fill="hold"/>
-                                        <p:tgtEl>
-                                          <p:spTgt spid="4"/>
-                                        </p:tgtEl>
-                                        <p:attrNameLst>
-                                          <p:attrName>ppt_x</p:attrName>
-                                        </p:attrNameLst>
-                                      </p:cBhvr>
-                                      <p:tavLst>
-                                        <p:tav tm="0">
-                                          <p:val>
-                                            <p:strVal val="1+#ppt_w/2"/>
-                                          </p:val>
-                                        </p:tav>
-                                        <p:tav tm="100000">
-                                          <p:val>
-                                            <p:strVal val="#ppt_x"/>
-                                          </p:val>
-                                        </p:tav>
-                                      </p:tavLst>
-                                    </p:anim>
-                                    <p:anim calcmode="lin" valueType="num">
-                                      <p:cBhvr additive="base">
-                                        <p:cTn id="8" dur="500" fill="hold"/>
-                                        <p:tgtEl>
-                                          <p:spTgt spid="4"/>
-                                        </p:tgtEl>
-                                        <p:attrNameLst>
-                                          <p:attrName>ppt_y</p:attrName>
-                                        </p:attrNameLst>
-                                      </p:cBhvr>
-                                      <p:tavLst>
-                                        <p:tav tm="0">
-                                          <p:val>
-                                            <p:strVal val="#ppt_y"/>
-                                          </p:val>
-                                        </p:tav>
-                                        <p:tav tm="100000">
-                                          <p:val>
-                                            <p:strVal val="#ppt_y"/>
-                                          </p:val>
-                                        </p:tav>
-                                      </p:tavLst>
-                                    </p:anim>
-                                  </p:childTnLst>
-                                </p:cTn>
-                              </p:par>
-                            </p:childTnLst>
-                          </p:cTn>
-                        </p:par>
-                      </p:childTnLst>
-                    </p:cTn>
-                  </p:par>
-                </p:childTnLst>
-              </p:cTn>
-              <p:prevCondLst>
-                <p:cond evt="onPrev" delay="0">
-                  <p:tgtEl>
-                    <p:sldTgt/>
-                  </p:tgtEl>
-                </p:cond>
-              </p:prevCondLst>
-              <p:nextCondLst>
-                <p:cond evt="onNext" delay="0">
-                  <p:tgtEl>
-                    <p:sldTgt/>
-                  </p:tgtEl>
-                </p:cond>
-              </p:nextCondLst>
-            </p:seq>
-          </p:childTnLst>
-        </p:cTn>
       </p:par>
     </p:tnLst>
   </p:timing>

</xml_diff>